<commit_message>
added the assessment to the module 'multichannel_images'
</commit_message>
<xml_diff>
--- a/module_resources/multichannel_images.pptx
+++ b/module_resources/multichannel_images.pptx
@@ -104,6 +104,11 @@
       </a:defRPr>
     </a:lvl9pPr>
   </p:defaultTextStyle>
+  <p:extLst>
+    <p:ext uri="{EFAFB233-063F-42B5-8137-9DF3F51BA10A}">
+      <p15:sldGuideLst xmlns:p15="http://schemas.microsoft.com/office/powerpoint/2012/main"/>
+    </p:ext>
+  </p:extLst>
 </p:presentation>
 </file>
 
@@ -256,7 +261,7 @@
           <a:p>
             <a:fld id="{6A0DF071-CC0B-499D-9891-ECCE98721D78}" type="datetimeFigureOut">
               <a:rPr lang="en-DE" smtClean="0"/>
-              <a:t>13/02/2024</a:t>
+              <a:t>14/02/2024</a:t>
             </a:fld>
             <a:endParaRPr lang="en-DE"/>
           </a:p>
@@ -456,7 +461,7 @@
           <a:p>
             <a:fld id="{6A0DF071-CC0B-499D-9891-ECCE98721D78}" type="datetimeFigureOut">
               <a:rPr lang="en-DE" smtClean="0"/>
-              <a:t>13/02/2024</a:t>
+              <a:t>14/02/2024</a:t>
             </a:fld>
             <a:endParaRPr lang="en-DE"/>
           </a:p>
@@ -666,7 +671,7 @@
           <a:p>
             <a:fld id="{6A0DF071-CC0B-499D-9891-ECCE98721D78}" type="datetimeFigureOut">
               <a:rPr lang="en-DE" smtClean="0"/>
-              <a:t>13/02/2024</a:t>
+              <a:t>14/02/2024</a:t>
             </a:fld>
             <a:endParaRPr lang="en-DE"/>
           </a:p>
@@ -866,7 +871,7 @@
           <a:p>
             <a:fld id="{6A0DF071-CC0B-499D-9891-ECCE98721D78}" type="datetimeFigureOut">
               <a:rPr lang="en-DE" smtClean="0"/>
-              <a:t>13/02/2024</a:t>
+              <a:t>14/02/2024</a:t>
             </a:fld>
             <a:endParaRPr lang="en-DE"/>
           </a:p>
@@ -1142,7 +1147,7 @@
           <a:p>
             <a:fld id="{6A0DF071-CC0B-499D-9891-ECCE98721D78}" type="datetimeFigureOut">
               <a:rPr lang="en-DE" smtClean="0"/>
-              <a:t>13/02/2024</a:t>
+              <a:t>14/02/2024</a:t>
             </a:fld>
             <a:endParaRPr lang="en-DE"/>
           </a:p>
@@ -1410,7 +1415,7 @@
           <a:p>
             <a:fld id="{6A0DF071-CC0B-499D-9891-ECCE98721D78}" type="datetimeFigureOut">
               <a:rPr lang="en-DE" smtClean="0"/>
-              <a:t>13/02/2024</a:t>
+              <a:t>14/02/2024</a:t>
             </a:fld>
             <a:endParaRPr lang="en-DE"/>
           </a:p>
@@ -1825,7 +1830,7 @@
           <a:p>
             <a:fld id="{6A0DF071-CC0B-499D-9891-ECCE98721D78}" type="datetimeFigureOut">
               <a:rPr lang="en-DE" smtClean="0"/>
-              <a:t>13/02/2024</a:t>
+              <a:t>14/02/2024</a:t>
             </a:fld>
             <a:endParaRPr lang="en-DE"/>
           </a:p>
@@ -1967,7 +1972,7 @@
           <a:p>
             <a:fld id="{6A0DF071-CC0B-499D-9891-ECCE98721D78}" type="datetimeFigureOut">
               <a:rPr lang="en-DE" smtClean="0"/>
-              <a:t>13/02/2024</a:t>
+              <a:t>14/02/2024</a:t>
             </a:fld>
             <a:endParaRPr lang="en-DE"/>
           </a:p>
@@ -2080,7 +2085,7 @@
           <a:p>
             <a:fld id="{6A0DF071-CC0B-499D-9891-ECCE98721D78}" type="datetimeFigureOut">
               <a:rPr lang="en-DE" smtClean="0"/>
-              <a:t>13/02/2024</a:t>
+              <a:t>14/02/2024</a:t>
             </a:fld>
             <a:endParaRPr lang="en-DE"/>
           </a:p>
@@ -2393,7 +2398,7 @@
           <a:p>
             <a:fld id="{6A0DF071-CC0B-499D-9891-ECCE98721D78}" type="datetimeFigureOut">
               <a:rPr lang="en-DE" smtClean="0"/>
-              <a:t>13/02/2024</a:t>
+              <a:t>14/02/2024</a:t>
             </a:fld>
             <a:endParaRPr lang="en-DE"/>
           </a:p>
@@ -2682,7 +2687,7 @@
           <a:p>
             <a:fld id="{6A0DF071-CC0B-499D-9891-ECCE98721D78}" type="datetimeFigureOut">
               <a:rPr lang="en-DE" smtClean="0"/>
-              <a:t>13/02/2024</a:t>
+              <a:t>14/02/2024</a:t>
             </a:fld>
             <a:endParaRPr lang="en-DE"/>
           </a:p>
@@ -2925,7 +2930,7 @@
           <a:p>
             <a:fld id="{6A0DF071-CC0B-499D-9891-ECCE98721D78}" type="datetimeFigureOut">
               <a:rPr lang="en-DE" smtClean="0"/>
-              <a:t>13/02/2024</a:t>
+              <a:t>14/02/2024</a:t>
             </a:fld>
             <a:endParaRPr lang="en-DE"/>
           </a:p>
@@ -3344,10 +3349,10 @@
       </p:grpSpPr>
       <p:grpSp>
         <p:nvGrpSpPr>
-          <p:cNvPr id="63" name="Group 62">
-            <a:extLst>
-              <a:ext uri="{FF2B5EF4-FFF2-40B4-BE49-F238E27FC236}">
-                <a16:creationId xmlns:a16="http://schemas.microsoft.com/office/drawing/2014/main" id="{55BE5FA6-0E96-4C8C-A3EA-FC93A7ADCA0B}"/>
+          <p:cNvPr id="12" name="Group 11">
+            <a:extLst>
+              <a:ext uri="{FF2B5EF4-FFF2-40B4-BE49-F238E27FC236}">
+                <a16:creationId xmlns:a16="http://schemas.microsoft.com/office/drawing/2014/main" id="{9894EB81-F286-4E35-B4FD-8E375D026A12}"/>
               </a:ext>
             </a:extLst>
           </p:cNvPr>
@@ -3362,402 +3367,12 @@
             <a:chExt cx="6471061" cy="3787010"/>
           </a:xfrm>
         </p:grpSpPr>
-        <p:pic>
-          <p:nvPicPr>
-            <p:cNvPr id="5" name="Picture 4">
+        <p:grpSp>
+          <p:nvGrpSpPr>
+            <p:cNvPr id="63" name="Group 62">
               <a:extLst>
                 <a:ext uri="{FF2B5EF4-FFF2-40B4-BE49-F238E27FC236}">
-                  <a16:creationId xmlns:a16="http://schemas.microsoft.com/office/drawing/2014/main" id="{14363C93-AB92-4EF1-BD00-AD99FA3E4E02}"/>
-                </a:ext>
-              </a:extLst>
-            </p:cNvPr>
-            <p:cNvPicPr>
-              <a:picLocks noChangeAspect="1"/>
-            </p:cNvPicPr>
-            <p:nvPr/>
-          </p:nvPicPr>
-          <p:blipFill>
-            <a:blip r:embed="rId2"/>
-            <a:stretch>
-              <a:fillRect/>
-            </a:stretch>
-          </p:blipFill>
-          <p:spPr>
-            <a:xfrm flipH="1">
-              <a:off x="2791249" y="990601"/>
-              <a:ext cx="1531739" cy="1167039"/>
-            </a:xfrm>
-            <a:prstGeom prst="rect">
-              <a:avLst/>
-            </a:prstGeom>
-          </p:spPr>
-        </p:pic>
-        <p:pic>
-          <p:nvPicPr>
-            <p:cNvPr id="7" name="Picture 6">
-              <a:extLst>
-                <a:ext uri="{FF2B5EF4-FFF2-40B4-BE49-F238E27FC236}">
-                  <a16:creationId xmlns:a16="http://schemas.microsoft.com/office/drawing/2014/main" id="{509FA99A-6311-4DB6-9FF4-B0D100DAA34F}"/>
-                </a:ext>
-              </a:extLst>
-            </p:cNvPr>
-            <p:cNvPicPr>
-              <a:picLocks noChangeAspect="1"/>
-            </p:cNvPicPr>
-            <p:nvPr/>
-          </p:nvPicPr>
-          <p:blipFill>
-            <a:blip r:embed="rId3"/>
-            <a:stretch>
-              <a:fillRect/>
-            </a:stretch>
-          </p:blipFill>
-          <p:spPr>
-            <a:xfrm>
-              <a:off x="2791249" y="2261961"/>
-              <a:ext cx="1531739" cy="1167039"/>
-            </a:xfrm>
-            <a:prstGeom prst="rect">
-              <a:avLst/>
-            </a:prstGeom>
-          </p:spPr>
-        </p:pic>
-        <p:pic>
-          <p:nvPicPr>
-            <p:cNvPr id="11" name="Picture 10">
-              <a:extLst>
-                <a:ext uri="{FF2B5EF4-FFF2-40B4-BE49-F238E27FC236}">
-                  <a16:creationId xmlns:a16="http://schemas.microsoft.com/office/drawing/2014/main" id="{0C1DD5E7-390C-4038-846E-0CCE15D2A8BC}"/>
-                </a:ext>
-              </a:extLst>
-            </p:cNvPr>
-            <p:cNvPicPr>
-              <a:picLocks noChangeAspect="1"/>
-            </p:cNvPicPr>
-            <p:nvPr/>
-          </p:nvPicPr>
-          <p:blipFill>
-            <a:blip r:embed="rId4"/>
-            <a:stretch>
-              <a:fillRect/>
-            </a:stretch>
-          </p:blipFill>
-          <p:spPr>
-            <a:xfrm>
-              <a:off x="2791249" y="3533321"/>
-              <a:ext cx="1531739" cy="1167039"/>
-            </a:xfrm>
-            <a:prstGeom prst="rect">
-              <a:avLst/>
-            </a:prstGeom>
-          </p:spPr>
-        </p:pic>
-        <p:cxnSp>
-          <p:nvCxnSpPr>
-            <p:cNvPr id="13" name="Straight Arrow Connector 12">
-              <a:extLst>
-                <a:ext uri="{FF2B5EF4-FFF2-40B4-BE49-F238E27FC236}">
-                  <a16:creationId xmlns:a16="http://schemas.microsoft.com/office/drawing/2014/main" id="{31830BC3-2C2E-4D26-8CEE-E6F222CE0CAA}"/>
-                </a:ext>
-              </a:extLst>
-            </p:cNvPr>
-            <p:cNvCxnSpPr>
-              <a:cxnSpLocks/>
-              <a:stCxn id="5" idx="1"/>
-            </p:cNvCxnSpPr>
-            <p:nvPr/>
-          </p:nvCxnSpPr>
-          <p:spPr>
-            <a:xfrm>
-              <a:off x="4322988" y="1574121"/>
-              <a:ext cx="1531739" cy="0"/>
-            </a:xfrm>
-            <a:prstGeom prst="straightConnector1">
-              <a:avLst/>
-            </a:prstGeom>
-            <a:ln>
-              <a:tailEnd type="triangle"/>
-            </a:ln>
-          </p:spPr>
-          <p:style>
-            <a:lnRef idx="1">
-              <a:schemeClr val="accent1"/>
-            </a:lnRef>
-            <a:fillRef idx="0">
-              <a:schemeClr val="accent1"/>
-            </a:fillRef>
-            <a:effectRef idx="0">
-              <a:schemeClr val="accent1"/>
-            </a:effectRef>
-            <a:fontRef idx="minor">
-              <a:schemeClr val="tx1"/>
-            </a:fontRef>
-          </p:style>
-        </p:cxnSp>
-        <p:cxnSp>
-          <p:nvCxnSpPr>
-            <p:cNvPr id="15" name="Straight Arrow Connector 14">
-              <a:extLst>
-                <a:ext uri="{FF2B5EF4-FFF2-40B4-BE49-F238E27FC236}">
-                  <a16:creationId xmlns:a16="http://schemas.microsoft.com/office/drawing/2014/main" id="{6771C8A4-679B-4065-BF37-DFEC203B9DDA}"/>
-                </a:ext>
-              </a:extLst>
-            </p:cNvPr>
-            <p:cNvCxnSpPr>
-              <a:cxnSpLocks/>
-              <a:stCxn id="7" idx="3"/>
-            </p:cNvCxnSpPr>
-            <p:nvPr/>
-          </p:nvCxnSpPr>
-          <p:spPr>
-            <a:xfrm flipV="1">
-              <a:off x="4322988" y="1678442"/>
-              <a:ext cx="1531739" cy="1167039"/>
-            </a:xfrm>
-            <a:prstGeom prst="straightConnector1">
-              <a:avLst/>
-            </a:prstGeom>
-            <a:ln>
-              <a:tailEnd type="triangle"/>
-            </a:ln>
-          </p:spPr>
-          <p:style>
-            <a:lnRef idx="1">
-              <a:schemeClr val="accent1"/>
-            </a:lnRef>
-            <a:fillRef idx="0">
-              <a:schemeClr val="accent1"/>
-            </a:fillRef>
-            <a:effectRef idx="0">
-              <a:schemeClr val="accent1"/>
-            </a:effectRef>
-            <a:fontRef idx="minor">
-              <a:schemeClr val="tx1"/>
-            </a:fontRef>
-          </p:style>
-        </p:cxnSp>
-        <p:cxnSp>
-          <p:nvCxnSpPr>
-            <p:cNvPr id="17" name="Straight Arrow Connector 16">
-              <a:extLst>
-                <a:ext uri="{FF2B5EF4-FFF2-40B4-BE49-F238E27FC236}">
-                  <a16:creationId xmlns:a16="http://schemas.microsoft.com/office/drawing/2014/main" id="{B7D1D204-AF6C-41C6-86D7-1505426F4FF3}"/>
-                </a:ext>
-              </a:extLst>
-            </p:cNvPr>
-            <p:cNvCxnSpPr>
-              <a:cxnSpLocks/>
-              <a:stCxn id="11" idx="3"/>
-            </p:cNvCxnSpPr>
-            <p:nvPr/>
-          </p:nvCxnSpPr>
-          <p:spPr>
-            <a:xfrm flipV="1">
-              <a:off x="4322988" y="1833395"/>
-              <a:ext cx="1531739" cy="2283446"/>
-            </a:xfrm>
-            <a:prstGeom prst="straightConnector1">
-              <a:avLst/>
-            </a:prstGeom>
-            <a:ln>
-              <a:tailEnd type="triangle"/>
-            </a:ln>
-          </p:spPr>
-          <p:style>
-            <a:lnRef idx="1">
-              <a:schemeClr val="accent1"/>
-            </a:lnRef>
-            <a:fillRef idx="0">
-              <a:schemeClr val="accent1"/>
-            </a:fillRef>
-            <a:effectRef idx="0">
-              <a:schemeClr val="accent1"/>
-            </a:effectRef>
-            <a:fontRef idx="minor">
-              <a:schemeClr val="tx1"/>
-            </a:fontRef>
-          </p:style>
-        </p:cxnSp>
-        <p:pic>
-          <p:nvPicPr>
-            <p:cNvPr id="20" name="Picture 19">
-              <a:extLst>
-                <a:ext uri="{FF2B5EF4-FFF2-40B4-BE49-F238E27FC236}">
-                  <a16:creationId xmlns:a16="http://schemas.microsoft.com/office/drawing/2014/main" id="{EE4D0176-3B54-4486-BB26-23BFD6983C40}"/>
-                </a:ext>
-              </a:extLst>
-            </p:cNvPr>
-            <p:cNvPicPr>
-              <a:picLocks noChangeAspect="1"/>
-            </p:cNvPicPr>
-            <p:nvPr/>
-          </p:nvPicPr>
-          <p:blipFill>
-            <a:blip r:embed="rId5"/>
-            <a:stretch>
-              <a:fillRect/>
-            </a:stretch>
-          </p:blipFill>
-          <p:spPr>
-            <a:xfrm>
-              <a:off x="5898298" y="976536"/>
-              <a:ext cx="1531739" cy="1167039"/>
-            </a:xfrm>
-            <a:prstGeom prst="rect">
-              <a:avLst/>
-            </a:prstGeom>
-          </p:spPr>
-        </p:pic>
-        <p:sp>
-          <p:nvSpPr>
-            <p:cNvPr id="21" name="TextBox 20">
-              <a:extLst>
-                <a:ext uri="{FF2B5EF4-FFF2-40B4-BE49-F238E27FC236}">
-                  <a16:creationId xmlns:a16="http://schemas.microsoft.com/office/drawing/2014/main" id="{1730241A-81E4-41E9-820D-DC1DDF4E3E33}"/>
-                </a:ext>
-              </a:extLst>
-            </p:cNvPr>
-            <p:cNvSpPr txBox="1"/>
-            <p:nvPr/>
-          </p:nvSpPr>
-          <p:spPr>
-            <a:xfrm>
-              <a:off x="1766144" y="1420231"/>
-              <a:ext cx="914033" cy="307777"/>
-            </a:xfrm>
-            <a:prstGeom prst="rect">
-              <a:avLst/>
-            </a:prstGeom>
-            <a:noFill/>
-          </p:spPr>
-          <p:txBody>
-            <a:bodyPr wrap="none" rtlCol="0">
-              <a:spAutoFit/>
-            </a:bodyPr>
-            <a:lstStyle/>
-            <a:p>
-              <a:r>
-                <a:rPr lang="en-US" sz="1400" dirty="0"/>
-                <a:t>Channel 1</a:t>
-              </a:r>
-              <a:endParaRPr lang="en-DE" sz="1400" dirty="0"/>
-            </a:p>
-          </p:txBody>
-        </p:sp>
-        <p:sp>
-          <p:nvSpPr>
-            <p:cNvPr id="22" name="TextBox 21">
-              <a:extLst>
-                <a:ext uri="{FF2B5EF4-FFF2-40B4-BE49-F238E27FC236}">
-                  <a16:creationId xmlns:a16="http://schemas.microsoft.com/office/drawing/2014/main" id="{F2AA1D22-4298-4A27-A72C-0DA9F3C5B3CC}"/>
-                </a:ext>
-              </a:extLst>
-            </p:cNvPr>
-            <p:cNvSpPr txBox="1"/>
-            <p:nvPr/>
-          </p:nvSpPr>
-          <p:spPr>
-            <a:xfrm>
-              <a:off x="1766145" y="3962951"/>
-              <a:ext cx="914033" cy="307777"/>
-            </a:xfrm>
-            <a:prstGeom prst="rect">
-              <a:avLst/>
-            </a:prstGeom>
-            <a:noFill/>
-          </p:spPr>
-          <p:txBody>
-            <a:bodyPr wrap="none" rtlCol="0">
-              <a:spAutoFit/>
-            </a:bodyPr>
-            <a:lstStyle/>
-            <a:p>
-              <a:r>
-                <a:rPr lang="en-US" sz="1400" dirty="0"/>
-                <a:t>Channel 3</a:t>
-              </a:r>
-              <a:endParaRPr lang="en-DE" sz="1400" dirty="0"/>
-            </a:p>
-          </p:txBody>
-        </p:sp>
-        <p:sp>
-          <p:nvSpPr>
-            <p:cNvPr id="23" name="TextBox 22">
-              <a:extLst>
-                <a:ext uri="{FF2B5EF4-FFF2-40B4-BE49-F238E27FC236}">
-                  <a16:creationId xmlns:a16="http://schemas.microsoft.com/office/drawing/2014/main" id="{FFC54961-04DA-4B5C-87E2-53542FB0080A}"/>
-                </a:ext>
-              </a:extLst>
-            </p:cNvPr>
-            <p:cNvSpPr txBox="1"/>
-            <p:nvPr/>
-          </p:nvSpPr>
-          <p:spPr>
-            <a:xfrm>
-              <a:off x="1766143" y="2691591"/>
-              <a:ext cx="914033" cy="307777"/>
-            </a:xfrm>
-            <a:prstGeom prst="rect">
-              <a:avLst/>
-            </a:prstGeom>
-            <a:noFill/>
-          </p:spPr>
-          <p:txBody>
-            <a:bodyPr wrap="none" rtlCol="0">
-              <a:spAutoFit/>
-            </a:bodyPr>
-            <a:lstStyle/>
-            <a:p>
-              <a:r>
-                <a:rPr lang="en-US" sz="1400" dirty="0"/>
-                <a:t>Channel 2</a:t>
-              </a:r>
-              <a:endParaRPr lang="en-DE" sz="1400" dirty="0"/>
-            </a:p>
-          </p:txBody>
-        </p:sp>
-        <p:sp>
-          <p:nvSpPr>
-            <p:cNvPr id="24" name="TextBox 23">
-              <a:extLst>
-                <a:ext uri="{FF2B5EF4-FFF2-40B4-BE49-F238E27FC236}">
-                  <a16:creationId xmlns:a16="http://schemas.microsoft.com/office/drawing/2014/main" id="{C1F783C0-195C-4129-8970-BAAE79332F21}"/>
-                </a:ext>
-              </a:extLst>
-            </p:cNvPr>
-            <p:cNvSpPr txBox="1"/>
-            <p:nvPr/>
-          </p:nvSpPr>
-          <p:spPr>
-            <a:xfrm>
-              <a:off x="5725767" y="2157640"/>
-              <a:ext cx="2329164" cy="307777"/>
-            </a:xfrm>
-            <a:prstGeom prst="rect">
-              <a:avLst/>
-            </a:prstGeom>
-            <a:noFill/>
-          </p:spPr>
-          <p:txBody>
-            <a:bodyPr wrap="square" rtlCol="0">
-              <a:spAutoFit/>
-            </a:bodyPr>
-            <a:lstStyle/>
-            <a:p>
-              <a:r>
-                <a:rPr lang="en-US" sz="1400" dirty="0"/>
-                <a:t>Overlaid 3-channel image</a:t>
-              </a:r>
-              <a:endParaRPr lang="en-DE" sz="1400" dirty="0"/>
-            </a:p>
-          </p:txBody>
-        </p:sp>
-        <p:grpSp>
-          <p:nvGrpSpPr>
-            <p:cNvPr id="44" name="Group 43">
-              <a:extLst>
-                <a:ext uri="{FF2B5EF4-FFF2-40B4-BE49-F238E27FC236}">
-                  <a16:creationId xmlns:a16="http://schemas.microsoft.com/office/drawing/2014/main" id="{5A2575E6-579B-4B5D-A50F-EDCC76FA754F}"/>
+                  <a16:creationId xmlns:a16="http://schemas.microsoft.com/office/drawing/2014/main" id="{55BE5FA6-0E96-4C8C-A3EA-FC93A7ADCA0B}"/>
                 </a:ext>
               </a:extLst>
             </p:cNvPr>
@@ -3766,197 +3381,78 @@
           </p:nvGrpSpPr>
           <p:grpSpPr>
             <a:xfrm>
-              <a:off x="5703167" y="2825352"/>
-              <a:ext cx="1910968" cy="1529768"/>
-              <a:chOff x="8514889" y="1966133"/>
-              <a:chExt cx="1910968" cy="1529768"/>
+              <a:off x="1766143" y="976536"/>
+              <a:ext cx="6471061" cy="3787010"/>
+              <a:chOff x="1766143" y="976536"/>
+              <a:chExt cx="6471061" cy="3787010"/>
             </a:xfrm>
           </p:grpSpPr>
-          <p:sp>
-            <p:nvSpPr>
-              <p:cNvPr id="25" name="Rectangle 24">
+          <p:pic>
+            <p:nvPicPr>
+              <p:cNvPr id="7" name="Picture 6">
                 <a:extLst>
                   <a:ext uri="{FF2B5EF4-FFF2-40B4-BE49-F238E27FC236}">
-                    <a16:creationId xmlns:a16="http://schemas.microsoft.com/office/drawing/2014/main" id="{C1B0F4D7-EDBF-4A6E-BB2E-43C6A2590D7A}"/>
+                    <a16:creationId xmlns:a16="http://schemas.microsoft.com/office/drawing/2014/main" id="{509FA99A-6311-4DB6-9FF4-B0D100DAA34F}"/>
                   </a:ext>
                 </a:extLst>
               </p:cNvPr>
-              <p:cNvSpPr/>
+              <p:cNvPicPr>
+                <a:picLocks noChangeAspect="1"/>
+              </p:cNvPicPr>
               <p:nvPr/>
-            </p:nvSpPr>
+            </p:nvPicPr>
+            <p:blipFill>
+              <a:blip r:embed="rId2"/>
+              <a:stretch>
+                <a:fillRect/>
+              </a:stretch>
+            </p:blipFill>
             <p:spPr>
               <a:xfrm>
-                <a:off x="8514889" y="2328862"/>
-                <a:ext cx="1596118" cy="1167039"/>
+                <a:off x="2791249" y="2261961"/>
+                <a:ext cx="1531739" cy="1167039"/>
               </a:xfrm>
               <a:prstGeom prst="rect">
                 <a:avLst/>
               </a:prstGeom>
-              <a:noFill/>
-              <a:ln>
-                <a:solidFill>
-                  <a:schemeClr val="accent5">
-                    <a:lumMod val="50000"/>
-                  </a:schemeClr>
-                </a:solidFill>
-              </a:ln>
             </p:spPr>
-            <p:style>
-              <a:lnRef idx="2">
-                <a:schemeClr val="accent1">
-                  <a:shade val="50000"/>
-                </a:schemeClr>
-              </a:lnRef>
-              <a:fillRef idx="1">
-                <a:schemeClr val="accent1"/>
-              </a:fillRef>
-              <a:effectRef idx="0">
-                <a:schemeClr val="accent1"/>
-              </a:effectRef>
-              <a:fontRef idx="minor">
-                <a:schemeClr val="lt1"/>
-              </a:fontRef>
-            </p:style>
-            <p:txBody>
-              <a:bodyPr rtlCol="0" anchor="ctr"/>
-              <a:lstStyle/>
-              <a:p>
-                <a:pPr algn="ctr"/>
-                <a:endParaRPr lang="en-DE"/>
-              </a:p>
-            </p:txBody>
-          </p:sp>
-          <p:sp>
-            <p:nvSpPr>
-              <p:cNvPr id="26" name="Rectangle 25">
+          </p:pic>
+          <p:pic>
+            <p:nvPicPr>
+              <p:cNvPr id="11" name="Picture 10">
                 <a:extLst>
                   <a:ext uri="{FF2B5EF4-FFF2-40B4-BE49-F238E27FC236}">
-                    <a16:creationId xmlns:a16="http://schemas.microsoft.com/office/drawing/2014/main" id="{1D44D9B0-5F86-4E79-BE19-568526F7CD74}"/>
+                    <a16:creationId xmlns:a16="http://schemas.microsoft.com/office/drawing/2014/main" id="{0C1DD5E7-390C-4038-846E-0CCE15D2A8BC}"/>
                   </a:ext>
                 </a:extLst>
               </p:cNvPr>
-              <p:cNvSpPr/>
+              <p:cNvPicPr>
+                <a:picLocks noChangeAspect="1"/>
+              </p:cNvPicPr>
               <p:nvPr/>
-            </p:nvSpPr>
+            </p:nvPicPr>
+            <p:blipFill>
+              <a:blip r:embed="rId3"/>
+              <a:stretch>
+                <a:fillRect/>
+              </a:stretch>
+            </p:blipFill>
             <p:spPr>
               <a:xfrm>
-                <a:off x="8667289" y="2145828"/>
-                <a:ext cx="1596118" cy="1167039"/>
+                <a:off x="2791249" y="3533321"/>
+                <a:ext cx="1531739" cy="1167039"/>
               </a:xfrm>
               <a:prstGeom prst="rect">
                 <a:avLst/>
               </a:prstGeom>
-              <a:noFill/>
-              <a:ln>
-                <a:solidFill>
-                  <a:srgbClr val="00B050"/>
-                </a:solidFill>
-              </a:ln>
             </p:spPr>
-            <p:style>
-              <a:lnRef idx="2">
-                <a:schemeClr val="accent1">
-                  <a:shade val="50000"/>
-                </a:schemeClr>
-              </a:lnRef>
-              <a:fillRef idx="1">
-                <a:schemeClr val="accent1"/>
-              </a:fillRef>
-              <a:effectRef idx="0">
-                <a:schemeClr val="accent1"/>
-              </a:effectRef>
-              <a:fontRef idx="minor">
-                <a:schemeClr val="lt1"/>
-              </a:fontRef>
-            </p:style>
-            <p:txBody>
-              <a:bodyPr rtlCol="0" anchor="ctr"/>
-              <a:lstStyle/>
-              <a:p>
-                <a:pPr algn="ctr"/>
-                <a:endParaRPr lang="en-DE"/>
-              </a:p>
-            </p:txBody>
-          </p:sp>
-          <p:sp>
-            <p:nvSpPr>
-              <p:cNvPr id="27" name="Rectangle 26">
+          </p:pic>
+          <p:cxnSp>
+            <p:nvCxnSpPr>
+              <p:cNvPr id="13" name="Straight Arrow Connector 12">
                 <a:extLst>
                   <a:ext uri="{FF2B5EF4-FFF2-40B4-BE49-F238E27FC236}">
-                    <a16:creationId xmlns:a16="http://schemas.microsoft.com/office/drawing/2014/main" id="{22EEC81C-EFEB-4AB3-BC6D-A746E072F10C}"/>
-                  </a:ext>
-                </a:extLst>
-              </p:cNvPr>
-              <p:cNvSpPr/>
-              <p:nvPr/>
-            </p:nvSpPr>
-            <p:spPr>
-              <a:xfrm>
-                <a:off x="8829739" y="1966133"/>
-                <a:ext cx="1596118" cy="1167039"/>
-              </a:xfrm>
-              <a:prstGeom prst="rect">
-                <a:avLst/>
-              </a:prstGeom>
-              <a:noFill/>
-              <a:ln>
-                <a:solidFill>
-                  <a:srgbClr val="FF0000"/>
-                </a:solidFill>
-              </a:ln>
-            </p:spPr>
-            <p:style>
-              <a:lnRef idx="2">
-                <a:schemeClr val="accent1">
-                  <a:shade val="50000"/>
-                </a:schemeClr>
-              </a:lnRef>
-              <a:fillRef idx="1">
-                <a:schemeClr val="accent1"/>
-              </a:fillRef>
-              <a:effectRef idx="0">
-                <a:schemeClr val="accent1"/>
-              </a:effectRef>
-              <a:fontRef idx="minor">
-                <a:schemeClr val="lt1"/>
-              </a:fontRef>
-            </p:style>
-            <p:txBody>
-              <a:bodyPr rtlCol="0" anchor="ctr"/>
-              <a:lstStyle/>
-              <a:p>
-                <a:pPr algn="ctr"/>
-                <a:endParaRPr lang="en-DE"/>
-              </a:p>
-            </p:txBody>
-          </p:sp>
-        </p:grpSp>
-        <p:grpSp>
-          <p:nvGrpSpPr>
-            <p:cNvPr id="43" name="Group 42">
-              <a:extLst>
-                <a:ext uri="{FF2B5EF4-FFF2-40B4-BE49-F238E27FC236}">
-                  <a16:creationId xmlns:a16="http://schemas.microsoft.com/office/drawing/2014/main" id="{55D1465C-A5B7-43AB-AA3F-73E3019FDF1E}"/>
-                </a:ext>
-              </a:extLst>
-            </p:cNvPr>
-            <p:cNvGrpSpPr/>
-            <p:nvPr/>
-          </p:nvGrpSpPr>
-          <p:grpSpPr>
-            <a:xfrm>
-              <a:off x="4958780" y="3969877"/>
-              <a:ext cx="766987" cy="730483"/>
-              <a:chOff x="7792310" y="3431390"/>
-              <a:chExt cx="766987" cy="730483"/>
-            </a:xfrm>
-          </p:grpSpPr>
-          <p:cxnSp>
-            <p:nvCxnSpPr>
-              <p:cNvPr id="29" name="Straight Arrow Connector 28">
-                <a:extLst>
-                  <a:ext uri="{FF2B5EF4-FFF2-40B4-BE49-F238E27FC236}">
-                    <a16:creationId xmlns:a16="http://schemas.microsoft.com/office/drawing/2014/main" id="{B1E4BF35-DC59-4738-B175-F083527A2A81}"/>
+                    <a16:creationId xmlns:a16="http://schemas.microsoft.com/office/drawing/2014/main" id="{31830BC3-2C2E-4D26-8CEE-E6F222CE0CAA}"/>
                   </a:ext>
                 </a:extLst>
               </p:cNvPr>
@@ -3967,8 +3463,8 @@
             </p:nvCxnSpPr>
             <p:spPr>
               <a:xfrm flipV="1">
-                <a:off x="7944711" y="3721580"/>
-                <a:ext cx="0" cy="307973"/>
+                <a:off x="4320188" y="1591311"/>
+                <a:ext cx="1534539" cy="1"/>
               </a:xfrm>
               <a:prstGeom prst="straightConnector1">
                 <a:avLst/>
@@ -3994,22 +3490,23 @@
           </p:cxnSp>
           <p:cxnSp>
             <p:nvCxnSpPr>
-              <p:cNvPr id="30" name="Straight Arrow Connector 29">
+              <p:cNvPr id="15" name="Straight Arrow Connector 14">
                 <a:extLst>
                   <a:ext uri="{FF2B5EF4-FFF2-40B4-BE49-F238E27FC236}">
-                    <a16:creationId xmlns:a16="http://schemas.microsoft.com/office/drawing/2014/main" id="{BF538C31-8858-468F-B4E0-3AAD868B145D}"/>
+                    <a16:creationId xmlns:a16="http://schemas.microsoft.com/office/drawing/2014/main" id="{6771C8A4-679B-4065-BF37-DFEC203B9DDA}"/>
                   </a:ext>
                 </a:extLst>
               </p:cNvPr>
               <p:cNvCxnSpPr>
                 <a:cxnSpLocks/>
+                <a:stCxn id="7" idx="3"/>
               </p:cNvCxnSpPr>
               <p:nvPr/>
             </p:nvCxnSpPr>
             <p:spPr>
               <a:xfrm flipV="1">
-                <a:off x="7944711" y="4029553"/>
-                <a:ext cx="325478" cy="1"/>
+                <a:off x="4322988" y="1678442"/>
+                <a:ext cx="1531739" cy="1167039"/>
               </a:xfrm>
               <a:prstGeom prst="straightConnector1">
                 <a:avLst/>
@@ -4035,22 +3532,23 @@
           </p:cxnSp>
           <p:cxnSp>
             <p:nvCxnSpPr>
-              <p:cNvPr id="32" name="Straight Arrow Connector 31">
+              <p:cNvPr id="17" name="Straight Arrow Connector 16">
                 <a:extLst>
                   <a:ext uri="{FF2B5EF4-FFF2-40B4-BE49-F238E27FC236}">
-                    <a16:creationId xmlns:a16="http://schemas.microsoft.com/office/drawing/2014/main" id="{B389F9B4-E02F-472B-A58E-A2FF9E95C108}"/>
+                    <a16:creationId xmlns:a16="http://schemas.microsoft.com/office/drawing/2014/main" id="{B7D1D204-AF6C-41C6-86D7-1505426F4FF3}"/>
                   </a:ext>
                 </a:extLst>
               </p:cNvPr>
               <p:cNvCxnSpPr>
                 <a:cxnSpLocks/>
+                <a:stCxn id="11" idx="3"/>
               </p:cNvCxnSpPr>
               <p:nvPr/>
             </p:nvCxnSpPr>
             <p:spPr>
               <a:xfrm flipV="1">
-                <a:off x="7944711" y="3816161"/>
-                <a:ext cx="220194" cy="213392"/>
+                <a:off x="4322988" y="1833395"/>
+                <a:ext cx="1531739" cy="2283446"/>
               </a:xfrm>
               <a:prstGeom prst="straightConnector1">
                 <a:avLst/>
@@ -4074,12 +3572,42 @@
               </a:fontRef>
             </p:style>
           </p:cxnSp>
+          <p:pic>
+            <p:nvPicPr>
+              <p:cNvPr id="20" name="Picture 19">
+                <a:extLst>
+                  <a:ext uri="{FF2B5EF4-FFF2-40B4-BE49-F238E27FC236}">
+                    <a16:creationId xmlns:a16="http://schemas.microsoft.com/office/drawing/2014/main" id="{EE4D0176-3B54-4486-BB26-23BFD6983C40}"/>
+                  </a:ext>
+                </a:extLst>
+              </p:cNvPr>
+              <p:cNvPicPr>
+                <a:picLocks noChangeAspect="1"/>
+              </p:cNvPicPr>
+              <p:nvPr/>
+            </p:nvPicPr>
+            <p:blipFill>
+              <a:blip r:embed="rId4"/>
+              <a:stretch>
+                <a:fillRect/>
+              </a:stretch>
+            </p:blipFill>
+            <p:spPr>
+              <a:xfrm>
+                <a:off x="5898298" y="976536"/>
+                <a:ext cx="1531739" cy="1167039"/>
+              </a:xfrm>
+              <a:prstGeom prst="rect">
+                <a:avLst/>
+              </a:prstGeom>
+            </p:spPr>
+          </p:pic>
           <p:sp>
             <p:nvSpPr>
-              <p:cNvPr id="39" name="TextBox 38">
+              <p:cNvPr id="21" name="TextBox 20">
                 <a:extLst>
                   <a:ext uri="{FF2B5EF4-FFF2-40B4-BE49-F238E27FC236}">
-                    <a16:creationId xmlns:a16="http://schemas.microsoft.com/office/drawing/2014/main" id="{D7D2CA90-B5C2-49AB-93E9-B50E60259ECE}"/>
+                    <a16:creationId xmlns:a16="http://schemas.microsoft.com/office/drawing/2014/main" id="{1730241A-81E4-41E9-820D-DC1DDF4E3E33}"/>
                   </a:ext>
                 </a:extLst>
               </p:cNvPr>
@@ -4088,8 +3616,116 @@
             </p:nvSpPr>
             <p:spPr>
               <a:xfrm>
-                <a:off x="8233820" y="3854096"/>
-                <a:ext cx="325477" cy="307777"/>
+                <a:off x="1766144" y="1420231"/>
+                <a:ext cx="914033" cy="307777"/>
+              </a:xfrm>
+              <a:prstGeom prst="rect">
+                <a:avLst/>
+              </a:prstGeom>
+              <a:noFill/>
+            </p:spPr>
+            <p:txBody>
+              <a:bodyPr wrap="none" rtlCol="0">
+                <a:spAutoFit/>
+              </a:bodyPr>
+              <a:lstStyle/>
+              <a:p>
+                <a:r>
+                  <a:rPr lang="en-US" sz="1400" dirty="0"/>
+                  <a:t>Channel 1</a:t>
+                </a:r>
+                <a:endParaRPr lang="en-DE" sz="1400" dirty="0"/>
+              </a:p>
+            </p:txBody>
+          </p:sp>
+          <p:sp>
+            <p:nvSpPr>
+              <p:cNvPr id="22" name="TextBox 21">
+                <a:extLst>
+                  <a:ext uri="{FF2B5EF4-FFF2-40B4-BE49-F238E27FC236}">
+                    <a16:creationId xmlns:a16="http://schemas.microsoft.com/office/drawing/2014/main" id="{F2AA1D22-4298-4A27-A72C-0DA9F3C5B3CC}"/>
+                  </a:ext>
+                </a:extLst>
+              </p:cNvPr>
+              <p:cNvSpPr txBox="1"/>
+              <p:nvPr/>
+            </p:nvSpPr>
+            <p:spPr>
+              <a:xfrm>
+                <a:off x="1766145" y="3962951"/>
+                <a:ext cx="914033" cy="307777"/>
+              </a:xfrm>
+              <a:prstGeom prst="rect">
+                <a:avLst/>
+              </a:prstGeom>
+              <a:noFill/>
+            </p:spPr>
+            <p:txBody>
+              <a:bodyPr wrap="none" rtlCol="0">
+                <a:spAutoFit/>
+              </a:bodyPr>
+              <a:lstStyle/>
+              <a:p>
+                <a:r>
+                  <a:rPr lang="en-US" sz="1400" dirty="0"/>
+                  <a:t>Channel 3</a:t>
+                </a:r>
+                <a:endParaRPr lang="en-DE" sz="1400" dirty="0"/>
+              </a:p>
+            </p:txBody>
+          </p:sp>
+          <p:sp>
+            <p:nvSpPr>
+              <p:cNvPr id="23" name="TextBox 22">
+                <a:extLst>
+                  <a:ext uri="{FF2B5EF4-FFF2-40B4-BE49-F238E27FC236}">
+                    <a16:creationId xmlns:a16="http://schemas.microsoft.com/office/drawing/2014/main" id="{FFC54961-04DA-4B5C-87E2-53542FB0080A}"/>
+                  </a:ext>
+                </a:extLst>
+              </p:cNvPr>
+              <p:cNvSpPr txBox="1"/>
+              <p:nvPr/>
+            </p:nvSpPr>
+            <p:spPr>
+              <a:xfrm>
+                <a:off x="1766143" y="2691591"/>
+                <a:ext cx="914033" cy="307777"/>
+              </a:xfrm>
+              <a:prstGeom prst="rect">
+                <a:avLst/>
+              </a:prstGeom>
+              <a:noFill/>
+            </p:spPr>
+            <p:txBody>
+              <a:bodyPr wrap="none" rtlCol="0">
+                <a:spAutoFit/>
+              </a:bodyPr>
+              <a:lstStyle/>
+              <a:p>
+                <a:r>
+                  <a:rPr lang="en-US" sz="1400" dirty="0"/>
+                  <a:t>Channel 2</a:t>
+                </a:r>
+                <a:endParaRPr lang="en-DE" sz="1400" dirty="0"/>
+              </a:p>
+            </p:txBody>
+          </p:sp>
+          <p:sp>
+            <p:nvSpPr>
+              <p:cNvPr id="24" name="TextBox 23">
+                <a:extLst>
+                  <a:ext uri="{FF2B5EF4-FFF2-40B4-BE49-F238E27FC236}">
+                    <a16:creationId xmlns:a16="http://schemas.microsoft.com/office/drawing/2014/main" id="{C1F783C0-195C-4129-8970-BAAE79332F21}"/>
+                  </a:ext>
+                </a:extLst>
+              </p:cNvPr>
+              <p:cNvSpPr txBox="1"/>
+              <p:nvPr/>
+            </p:nvSpPr>
+            <p:spPr>
+              <a:xfrm>
+                <a:off x="5725767" y="2157640"/>
+                <a:ext cx="2329164" cy="307777"/>
               </a:xfrm>
               <a:prstGeom prst="rect">
                 <a:avLst/>
@@ -4103,27 +3739,474 @@
               <a:lstStyle/>
               <a:p>
                 <a:r>
-                  <a:rPr lang="en-US" sz="1400" b="1" dirty="0">
+                  <a:rPr lang="en-US" sz="1400" dirty="0"/>
+                  <a:t>Overlaid 3-channel image</a:t>
+                </a:r>
+                <a:endParaRPr lang="en-DE" sz="1400" dirty="0"/>
+              </a:p>
+            </p:txBody>
+          </p:sp>
+          <p:grpSp>
+            <p:nvGrpSpPr>
+              <p:cNvPr id="44" name="Group 43">
+                <a:extLst>
+                  <a:ext uri="{FF2B5EF4-FFF2-40B4-BE49-F238E27FC236}">
+                    <a16:creationId xmlns:a16="http://schemas.microsoft.com/office/drawing/2014/main" id="{5A2575E6-579B-4B5D-A50F-EDCC76FA754F}"/>
+                  </a:ext>
+                </a:extLst>
+              </p:cNvPr>
+              <p:cNvGrpSpPr/>
+              <p:nvPr/>
+            </p:nvGrpSpPr>
+            <p:grpSpPr>
+              <a:xfrm>
+                <a:off x="5703167" y="2825352"/>
+                <a:ext cx="1910968" cy="1529768"/>
+                <a:chOff x="8514889" y="1966133"/>
+                <a:chExt cx="1910968" cy="1529768"/>
+              </a:xfrm>
+            </p:grpSpPr>
+            <p:sp>
+              <p:nvSpPr>
+                <p:cNvPr id="25" name="Rectangle 24">
+                  <a:extLst>
+                    <a:ext uri="{FF2B5EF4-FFF2-40B4-BE49-F238E27FC236}">
+                      <a16:creationId xmlns:a16="http://schemas.microsoft.com/office/drawing/2014/main" id="{C1B0F4D7-EDBF-4A6E-BB2E-43C6A2590D7A}"/>
+                    </a:ext>
+                  </a:extLst>
+                </p:cNvPr>
+                <p:cNvSpPr/>
+                <p:nvPr/>
+              </p:nvSpPr>
+              <p:spPr>
+                <a:xfrm>
+                  <a:off x="8514889" y="2328862"/>
+                  <a:ext cx="1596118" cy="1167039"/>
+                </a:xfrm>
+                <a:prstGeom prst="rect">
+                  <a:avLst/>
+                </a:prstGeom>
+                <a:noFill/>
+                <a:ln>
+                  <a:solidFill>
+                    <a:schemeClr val="accent5">
+                      <a:lumMod val="50000"/>
+                    </a:schemeClr>
+                  </a:solidFill>
+                </a:ln>
+              </p:spPr>
+              <p:style>
+                <a:lnRef idx="2">
+                  <a:schemeClr val="accent1">
+                    <a:shade val="50000"/>
+                  </a:schemeClr>
+                </a:lnRef>
+                <a:fillRef idx="1">
+                  <a:schemeClr val="accent1"/>
+                </a:fillRef>
+                <a:effectRef idx="0">
+                  <a:schemeClr val="accent1"/>
+                </a:effectRef>
+                <a:fontRef idx="minor">
+                  <a:schemeClr val="lt1"/>
+                </a:fontRef>
+              </p:style>
+              <p:txBody>
+                <a:bodyPr rtlCol="0" anchor="ctr"/>
+                <a:lstStyle/>
+                <a:p>
+                  <a:pPr algn="ctr"/>
+                  <a:endParaRPr lang="en-DE"/>
+                </a:p>
+              </p:txBody>
+            </p:sp>
+            <p:sp>
+              <p:nvSpPr>
+                <p:cNvPr id="26" name="Rectangle 25">
+                  <a:extLst>
+                    <a:ext uri="{FF2B5EF4-FFF2-40B4-BE49-F238E27FC236}">
+                      <a16:creationId xmlns:a16="http://schemas.microsoft.com/office/drawing/2014/main" id="{1D44D9B0-5F86-4E79-BE19-568526F7CD74}"/>
+                    </a:ext>
+                  </a:extLst>
+                </p:cNvPr>
+                <p:cNvSpPr/>
+                <p:nvPr/>
+              </p:nvSpPr>
+              <p:spPr>
+                <a:xfrm>
+                  <a:off x="8667289" y="2145828"/>
+                  <a:ext cx="1596118" cy="1167039"/>
+                </a:xfrm>
+                <a:prstGeom prst="rect">
+                  <a:avLst/>
+                </a:prstGeom>
+                <a:noFill/>
+                <a:ln>
+                  <a:solidFill>
+                    <a:srgbClr val="00B050"/>
+                  </a:solidFill>
+                </a:ln>
+              </p:spPr>
+              <p:style>
+                <a:lnRef idx="2">
+                  <a:schemeClr val="accent1">
+                    <a:shade val="50000"/>
+                  </a:schemeClr>
+                </a:lnRef>
+                <a:fillRef idx="1">
+                  <a:schemeClr val="accent1"/>
+                </a:fillRef>
+                <a:effectRef idx="0">
+                  <a:schemeClr val="accent1"/>
+                </a:effectRef>
+                <a:fontRef idx="minor">
+                  <a:schemeClr val="lt1"/>
+                </a:fontRef>
+              </p:style>
+              <p:txBody>
+                <a:bodyPr rtlCol="0" anchor="ctr"/>
+                <a:lstStyle/>
+                <a:p>
+                  <a:pPr algn="ctr"/>
+                  <a:endParaRPr lang="en-DE"/>
+                </a:p>
+              </p:txBody>
+            </p:sp>
+            <p:sp>
+              <p:nvSpPr>
+                <p:cNvPr id="27" name="Rectangle 26">
+                  <a:extLst>
+                    <a:ext uri="{FF2B5EF4-FFF2-40B4-BE49-F238E27FC236}">
+                      <a16:creationId xmlns:a16="http://schemas.microsoft.com/office/drawing/2014/main" id="{22EEC81C-EFEB-4AB3-BC6D-A746E072F10C}"/>
+                    </a:ext>
+                  </a:extLst>
+                </p:cNvPr>
+                <p:cNvSpPr/>
+                <p:nvPr/>
+              </p:nvSpPr>
+              <p:spPr>
+                <a:xfrm>
+                  <a:off x="8829739" y="1966133"/>
+                  <a:ext cx="1596118" cy="1167039"/>
+                </a:xfrm>
+                <a:prstGeom prst="rect">
+                  <a:avLst/>
+                </a:prstGeom>
+                <a:noFill/>
+                <a:ln>
+                  <a:solidFill>
+                    <a:srgbClr val="FF0000"/>
+                  </a:solidFill>
+                </a:ln>
+              </p:spPr>
+              <p:style>
+                <a:lnRef idx="2">
+                  <a:schemeClr val="accent1">
+                    <a:shade val="50000"/>
+                  </a:schemeClr>
+                </a:lnRef>
+                <a:fillRef idx="1">
+                  <a:schemeClr val="accent1"/>
+                </a:fillRef>
+                <a:effectRef idx="0">
+                  <a:schemeClr val="accent1"/>
+                </a:effectRef>
+                <a:fontRef idx="minor">
+                  <a:schemeClr val="lt1"/>
+                </a:fontRef>
+              </p:style>
+              <p:txBody>
+                <a:bodyPr rtlCol="0" anchor="ctr"/>
+                <a:lstStyle/>
+                <a:p>
+                  <a:pPr algn="ctr"/>
+                  <a:endParaRPr lang="en-DE"/>
+                </a:p>
+              </p:txBody>
+            </p:sp>
+          </p:grpSp>
+          <p:grpSp>
+            <p:nvGrpSpPr>
+              <p:cNvPr id="43" name="Group 42">
+                <a:extLst>
+                  <a:ext uri="{FF2B5EF4-FFF2-40B4-BE49-F238E27FC236}">
+                    <a16:creationId xmlns:a16="http://schemas.microsoft.com/office/drawing/2014/main" id="{55D1465C-A5B7-43AB-AA3F-73E3019FDF1E}"/>
+                  </a:ext>
+                </a:extLst>
+              </p:cNvPr>
+              <p:cNvGrpSpPr/>
+              <p:nvPr/>
+            </p:nvGrpSpPr>
+            <p:grpSpPr>
+              <a:xfrm>
+                <a:off x="4958780" y="3969877"/>
+                <a:ext cx="766987" cy="730483"/>
+                <a:chOff x="7792310" y="3431390"/>
+                <a:chExt cx="766987" cy="730483"/>
+              </a:xfrm>
+            </p:grpSpPr>
+            <p:cxnSp>
+              <p:nvCxnSpPr>
+                <p:cNvPr id="29" name="Straight Arrow Connector 28">
+                  <a:extLst>
+                    <a:ext uri="{FF2B5EF4-FFF2-40B4-BE49-F238E27FC236}">
+                      <a16:creationId xmlns:a16="http://schemas.microsoft.com/office/drawing/2014/main" id="{B1E4BF35-DC59-4738-B175-F083527A2A81}"/>
+                    </a:ext>
+                  </a:extLst>
+                </p:cNvPr>
+                <p:cNvCxnSpPr>
+                  <a:cxnSpLocks/>
+                </p:cNvCxnSpPr>
+                <p:nvPr/>
+              </p:nvCxnSpPr>
+              <p:spPr>
+                <a:xfrm flipV="1">
+                  <a:off x="7944711" y="3721580"/>
+                  <a:ext cx="0" cy="307973"/>
+                </a:xfrm>
+                <a:prstGeom prst="straightConnector1">
+                  <a:avLst/>
+                </a:prstGeom>
+                <a:ln>
+                  <a:tailEnd type="triangle"/>
+                </a:ln>
+              </p:spPr>
+              <p:style>
+                <a:lnRef idx="1">
+                  <a:schemeClr val="accent1"/>
+                </a:lnRef>
+                <a:fillRef idx="0">
+                  <a:schemeClr val="accent1"/>
+                </a:fillRef>
+                <a:effectRef idx="0">
+                  <a:schemeClr val="accent1"/>
+                </a:effectRef>
+                <a:fontRef idx="minor">
+                  <a:schemeClr val="tx1"/>
+                </a:fontRef>
+              </p:style>
+            </p:cxnSp>
+            <p:cxnSp>
+              <p:nvCxnSpPr>
+                <p:cNvPr id="30" name="Straight Arrow Connector 29">
+                  <a:extLst>
+                    <a:ext uri="{FF2B5EF4-FFF2-40B4-BE49-F238E27FC236}">
+                      <a16:creationId xmlns:a16="http://schemas.microsoft.com/office/drawing/2014/main" id="{BF538C31-8858-468F-B4E0-3AAD868B145D}"/>
+                    </a:ext>
+                  </a:extLst>
+                </p:cNvPr>
+                <p:cNvCxnSpPr>
+                  <a:cxnSpLocks/>
+                </p:cNvCxnSpPr>
+                <p:nvPr/>
+              </p:nvCxnSpPr>
+              <p:spPr>
+                <a:xfrm flipV="1">
+                  <a:off x="7944711" y="4029553"/>
+                  <a:ext cx="325478" cy="1"/>
+                </a:xfrm>
+                <a:prstGeom prst="straightConnector1">
+                  <a:avLst/>
+                </a:prstGeom>
+                <a:ln>
+                  <a:tailEnd type="triangle"/>
+                </a:ln>
+              </p:spPr>
+              <p:style>
+                <a:lnRef idx="1">
+                  <a:schemeClr val="accent1"/>
+                </a:lnRef>
+                <a:fillRef idx="0">
+                  <a:schemeClr val="accent1"/>
+                </a:fillRef>
+                <a:effectRef idx="0">
+                  <a:schemeClr val="accent1"/>
+                </a:effectRef>
+                <a:fontRef idx="minor">
+                  <a:schemeClr val="tx1"/>
+                </a:fontRef>
+              </p:style>
+            </p:cxnSp>
+            <p:cxnSp>
+              <p:nvCxnSpPr>
+                <p:cNvPr id="32" name="Straight Arrow Connector 31">
+                  <a:extLst>
+                    <a:ext uri="{FF2B5EF4-FFF2-40B4-BE49-F238E27FC236}">
+                      <a16:creationId xmlns:a16="http://schemas.microsoft.com/office/drawing/2014/main" id="{B389F9B4-E02F-472B-A58E-A2FF9E95C108}"/>
+                    </a:ext>
+                  </a:extLst>
+                </p:cNvPr>
+                <p:cNvCxnSpPr>
+                  <a:cxnSpLocks/>
+                </p:cNvCxnSpPr>
+                <p:nvPr/>
+              </p:nvCxnSpPr>
+              <p:spPr>
+                <a:xfrm flipV="1">
+                  <a:off x="7944711" y="3816161"/>
+                  <a:ext cx="220194" cy="213392"/>
+                </a:xfrm>
+                <a:prstGeom prst="straightConnector1">
+                  <a:avLst/>
+                </a:prstGeom>
+                <a:ln>
+                  <a:tailEnd type="triangle"/>
+                </a:ln>
+              </p:spPr>
+              <p:style>
+                <a:lnRef idx="1">
+                  <a:schemeClr val="accent1"/>
+                </a:lnRef>
+                <a:fillRef idx="0">
+                  <a:schemeClr val="accent1"/>
+                </a:fillRef>
+                <a:effectRef idx="0">
+                  <a:schemeClr val="accent1"/>
+                </a:effectRef>
+                <a:fontRef idx="minor">
+                  <a:schemeClr val="tx1"/>
+                </a:fontRef>
+              </p:style>
+            </p:cxnSp>
+            <p:sp>
+              <p:nvSpPr>
+                <p:cNvPr id="39" name="TextBox 38">
+                  <a:extLst>
+                    <a:ext uri="{FF2B5EF4-FFF2-40B4-BE49-F238E27FC236}">
+                      <a16:creationId xmlns:a16="http://schemas.microsoft.com/office/drawing/2014/main" id="{D7D2CA90-B5C2-49AB-93E9-B50E60259ECE}"/>
+                    </a:ext>
+                  </a:extLst>
+                </p:cNvPr>
+                <p:cNvSpPr txBox="1"/>
+                <p:nvPr/>
+              </p:nvSpPr>
+              <p:spPr>
+                <a:xfrm>
+                  <a:off x="8233820" y="3854096"/>
+                  <a:ext cx="325477" cy="307777"/>
+                </a:xfrm>
+                <a:prstGeom prst="rect">
+                  <a:avLst/>
+                </a:prstGeom>
+                <a:noFill/>
+              </p:spPr>
+              <p:txBody>
+                <a:bodyPr wrap="square" rtlCol="0">
+                  <a:spAutoFit/>
+                </a:bodyPr>
+                <a:lstStyle/>
+                <a:p>
+                  <a:r>
+                    <a:rPr lang="en-US" sz="1400" b="1" dirty="0">
+                      <a:solidFill>
+                        <a:srgbClr val="0070C0"/>
+                      </a:solidFill>
+                    </a:rPr>
+                    <a:t>x</a:t>
+                  </a:r>
+                  <a:endParaRPr lang="en-DE" sz="1400" b="1" dirty="0">
                     <a:solidFill>
                       <a:srgbClr val="0070C0"/>
                     </a:solidFill>
-                  </a:rPr>
-                  <a:t>x</a:t>
-                </a:r>
-                <a:endParaRPr lang="en-DE" sz="1400" b="1" dirty="0">
-                  <a:solidFill>
-                    <a:srgbClr val="0070C0"/>
-                  </a:solidFill>
-                </a:endParaRPr>
-              </a:p>
-            </p:txBody>
-          </p:sp>
+                  </a:endParaRPr>
+                </a:p>
+              </p:txBody>
+            </p:sp>
+            <p:sp>
+              <p:nvSpPr>
+                <p:cNvPr id="40" name="TextBox 39">
+                  <a:extLst>
+                    <a:ext uri="{FF2B5EF4-FFF2-40B4-BE49-F238E27FC236}">
+                      <a16:creationId xmlns:a16="http://schemas.microsoft.com/office/drawing/2014/main" id="{2AED9CE8-F6E3-4478-B658-606EA684ECCE}"/>
+                    </a:ext>
+                  </a:extLst>
+                </p:cNvPr>
+                <p:cNvSpPr txBox="1"/>
+                <p:nvPr/>
+              </p:nvSpPr>
+              <p:spPr>
+                <a:xfrm flipH="1">
+                  <a:off x="7792310" y="3431390"/>
+                  <a:ext cx="432312" cy="307777"/>
+                </a:xfrm>
+                <a:prstGeom prst="rect">
+                  <a:avLst/>
+                </a:prstGeom>
+                <a:noFill/>
+              </p:spPr>
+              <p:txBody>
+                <a:bodyPr wrap="square" rtlCol="0">
+                  <a:spAutoFit/>
+                </a:bodyPr>
+                <a:lstStyle/>
+                <a:p>
+                  <a:r>
+                    <a:rPr lang="en-US" sz="1400" b="1" dirty="0">
+                      <a:solidFill>
+                        <a:srgbClr val="0070C0"/>
+                      </a:solidFill>
+                    </a:rPr>
+                    <a:t>y</a:t>
+                  </a:r>
+                  <a:endParaRPr lang="en-DE" sz="1400" b="1" dirty="0">
+                    <a:solidFill>
+                      <a:srgbClr val="0070C0"/>
+                    </a:solidFill>
+                  </a:endParaRPr>
+                </a:p>
+              </p:txBody>
+            </p:sp>
+            <p:sp>
+              <p:nvSpPr>
+                <p:cNvPr id="41" name="TextBox 40">
+                  <a:extLst>
+                    <a:ext uri="{FF2B5EF4-FFF2-40B4-BE49-F238E27FC236}">
+                      <a16:creationId xmlns:a16="http://schemas.microsoft.com/office/drawing/2014/main" id="{6E38B626-3663-495F-97BA-8962E0F9C55D}"/>
+                    </a:ext>
+                  </a:extLst>
+                </p:cNvPr>
+                <p:cNvSpPr txBox="1"/>
+                <p:nvPr/>
+              </p:nvSpPr>
+              <p:spPr>
+                <a:xfrm flipH="1">
+                  <a:off x="8126985" y="3609505"/>
+                  <a:ext cx="432312" cy="307777"/>
+                </a:xfrm>
+                <a:prstGeom prst="rect">
+                  <a:avLst/>
+                </a:prstGeom>
+                <a:noFill/>
+              </p:spPr>
+              <p:txBody>
+                <a:bodyPr wrap="square" rtlCol="0">
+                  <a:spAutoFit/>
+                </a:bodyPr>
+                <a:lstStyle/>
+                <a:p>
+                  <a:r>
+                    <a:rPr lang="en-US" sz="1400" b="1" dirty="0">
+                      <a:solidFill>
+                        <a:srgbClr val="0070C0"/>
+                      </a:solidFill>
+                    </a:rPr>
+                    <a:t>c</a:t>
+                  </a:r>
+                  <a:endParaRPr lang="en-DE" sz="1400" b="1" dirty="0">
+                    <a:solidFill>
+                      <a:srgbClr val="0070C0"/>
+                    </a:solidFill>
+                  </a:endParaRPr>
+                </a:p>
+              </p:txBody>
+            </p:sp>
+          </p:grpSp>
           <p:sp>
             <p:nvSpPr>
-              <p:cNvPr id="40" name="TextBox 39">
+              <p:cNvPr id="62" name="TextBox 61">
                 <a:extLst>
                   <a:ext uri="{FF2B5EF4-FFF2-40B4-BE49-F238E27FC236}">
-                    <a16:creationId xmlns:a16="http://schemas.microsoft.com/office/drawing/2014/main" id="{2AED9CE8-F6E3-4478-B658-606EA684ECCE}"/>
+                    <a16:creationId xmlns:a16="http://schemas.microsoft.com/office/drawing/2014/main" id="{18F4971E-5078-498D-A415-A6B84B5D08C9}"/>
                   </a:ext>
                 </a:extLst>
               </p:cNvPr>
@@ -4131,9 +4214,9 @@
               <p:nvPr/>
             </p:nvSpPr>
             <p:spPr>
-              <a:xfrm flipH="1">
-                <a:off x="7792310" y="3431390"/>
-                <a:ext cx="432312" cy="307777"/>
+              <a:xfrm>
+                <a:off x="5908040" y="4455769"/>
+                <a:ext cx="2329164" cy="307777"/>
               </a:xfrm>
               <a:prstGeom prst="rect">
                 <a:avLst/>
@@ -4147,102 +4230,44 @@
               <a:lstStyle/>
               <a:p>
                 <a:r>
-                  <a:rPr lang="en-US" sz="1400" b="1" dirty="0">
-                    <a:solidFill>
-                      <a:srgbClr val="0070C0"/>
-                    </a:solidFill>
-                  </a:rPr>
-                  <a:t>y</a:t>
+                  <a:rPr lang="en-US" sz="1400" dirty="0"/>
+                  <a:t>Array shape: (x, y, c)</a:t>
                 </a:r>
-                <a:endParaRPr lang="en-DE" sz="1400" b="1" dirty="0">
-                  <a:solidFill>
-                    <a:srgbClr val="0070C0"/>
-                  </a:solidFill>
-                </a:endParaRPr>
-              </a:p>
-            </p:txBody>
-          </p:sp>
-          <p:sp>
-            <p:nvSpPr>
-              <p:cNvPr id="41" name="TextBox 40">
-                <a:extLst>
-                  <a:ext uri="{FF2B5EF4-FFF2-40B4-BE49-F238E27FC236}">
-                    <a16:creationId xmlns:a16="http://schemas.microsoft.com/office/drawing/2014/main" id="{6E38B626-3663-495F-97BA-8962E0F9C55D}"/>
-                  </a:ext>
-                </a:extLst>
-              </p:cNvPr>
-              <p:cNvSpPr txBox="1"/>
-              <p:nvPr/>
-            </p:nvSpPr>
-            <p:spPr>
-              <a:xfrm flipH="1">
-                <a:off x="8126985" y="3609505"/>
-                <a:ext cx="432312" cy="307777"/>
-              </a:xfrm>
-              <a:prstGeom prst="rect">
-                <a:avLst/>
-              </a:prstGeom>
-              <a:noFill/>
-            </p:spPr>
-            <p:txBody>
-              <a:bodyPr wrap="square" rtlCol="0">
-                <a:spAutoFit/>
-              </a:bodyPr>
-              <a:lstStyle/>
-              <a:p>
-                <a:r>
-                  <a:rPr lang="en-US" sz="1400" b="1" dirty="0">
-                    <a:solidFill>
-                      <a:srgbClr val="0070C0"/>
-                    </a:solidFill>
-                  </a:rPr>
-                  <a:t>c</a:t>
-                </a:r>
-                <a:endParaRPr lang="en-DE" sz="1400" b="1" dirty="0">
-                  <a:solidFill>
-                    <a:srgbClr val="0070C0"/>
-                  </a:solidFill>
-                </a:endParaRPr>
+                <a:endParaRPr lang="en-DE" sz="1400" dirty="0"/>
               </a:p>
             </p:txBody>
           </p:sp>
         </p:grpSp>
-        <p:sp>
-          <p:nvSpPr>
-            <p:cNvPr id="62" name="TextBox 61">
+        <p:pic>
+          <p:nvPicPr>
+            <p:cNvPr id="4" name="Picture 3">
               <a:extLst>
                 <a:ext uri="{FF2B5EF4-FFF2-40B4-BE49-F238E27FC236}">
-                  <a16:creationId xmlns:a16="http://schemas.microsoft.com/office/drawing/2014/main" id="{18F4971E-5078-498D-A415-A6B84B5D08C9}"/>
+                  <a16:creationId xmlns:a16="http://schemas.microsoft.com/office/drawing/2014/main" id="{2A3BD8D0-EDC8-40FD-9526-5C74006B954A}"/>
                 </a:ext>
               </a:extLst>
             </p:cNvPr>
-            <p:cNvSpPr txBox="1"/>
+            <p:cNvPicPr>
+              <a:picLocks noChangeAspect="1"/>
+            </p:cNvPicPr>
             <p:nvPr/>
-          </p:nvSpPr>
+          </p:nvPicPr>
+          <p:blipFill>
+            <a:blip r:embed="rId5"/>
+            <a:stretch>
+              <a:fillRect/>
+            </a:stretch>
+          </p:blipFill>
           <p:spPr>
             <a:xfrm>
-              <a:off x="5908040" y="4455769"/>
-              <a:ext cx="2329164" cy="307777"/>
+              <a:off x="2802213" y="1001088"/>
+              <a:ext cx="1517975" cy="1156552"/>
             </a:xfrm>
             <a:prstGeom prst="rect">
               <a:avLst/>
             </a:prstGeom>
-            <a:noFill/>
           </p:spPr>
-          <p:txBody>
-            <a:bodyPr wrap="square" rtlCol="0">
-              <a:spAutoFit/>
-            </a:bodyPr>
-            <a:lstStyle/>
-            <a:p>
-              <a:r>
-                <a:rPr lang="en-US" sz="1400" dirty="0"/>
-                <a:t>Array shape: (x, y, c)</a:t>
-              </a:r>
-              <a:endParaRPr lang="en-DE" sz="1400" dirty="0"/>
-            </a:p>
-          </p:txBody>
-        </p:sp>
+        </p:pic>
       </p:grpSp>
     </p:spTree>
     <p:extLst>

</xml_diff>